<commit_message>
Complétion de ma partie.
</commit_message>
<xml_diff>
--- a/documents/v2.0/Presentation - PierreDo.pptx
+++ b/documents/v2.0/Presentation - PierreDo.pptx
@@ -5,7 +5,7 @@
     <p:sldMasterId id="2147483648" r:id="rId1"/>
   </p:sldMasterIdLst>
   <p:notesMasterIdLst>
-    <p:notesMasterId r:id="rId14"/>
+    <p:notesMasterId r:id="rId15"/>
   </p:notesMasterIdLst>
   <p:sldIdLst>
     <p:sldId id="256" r:id="rId2"/>
@@ -17,9 +17,10 @@
     <p:sldId id="267" r:id="rId8"/>
     <p:sldId id="269" r:id="rId9"/>
     <p:sldId id="275" r:id="rId10"/>
-    <p:sldId id="270" r:id="rId11"/>
-    <p:sldId id="268" r:id="rId12"/>
-    <p:sldId id="264" r:id="rId13"/>
+    <p:sldId id="277" r:id="rId11"/>
+    <p:sldId id="270" r:id="rId12"/>
+    <p:sldId id="268" r:id="rId13"/>
+    <p:sldId id="264" r:id="rId14"/>
   </p:sldIdLst>
   <p:sldSz cx="9144000" cy="6858000" type="screen4x3"/>
   <p:notesSz cx="6797675" cy="9874250"/>
@@ -234,7 +235,7 @@
             <a:fld id="{D761A794-15E8-4C19-9429-90557F78B1C8}" type="datetimeFigureOut">
               <a:rPr lang="fr-FR" smtClean="0"/>
               <a:pPr/>
-              <a:t>10/06/2010</a:t>
+              <a:t>11/06/2010</a:t>
             </a:fld>
             <a:endParaRPr lang="fr-CH" dirty="0"/>
           </a:p>
@@ -664,6 +665,88 @@
 </p:notes>
 </file>
 
+<file path=ppt/notesSlides/notesSlide3.xml><?xml version="1.0" encoding="utf-8"?>
+<p:notes xmlns:a="http://schemas.openxmlformats.org/drawingml/2006/main" xmlns:r="http://schemas.openxmlformats.org/officeDocument/2006/relationships" xmlns:p="http://schemas.openxmlformats.org/presentationml/2006/main">
+  <p:cSld>
+    <p:spTree>
+      <p:nvGrpSpPr>
+        <p:cNvPr id="1" name=""/>
+        <p:cNvGrpSpPr/>
+        <p:nvPr/>
+      </p:nvGrpSpPr>
+      <p:grpSpPr>
+        <a:xfrm>
+          <a:off x="0" y="0"/>
+          <a:ext cx="0" cy="0"/>
+          <a:chOff x="0" y="0"/>
+          <a:chExt cx="0" cy="0"/>
+        </a:xfrm>
+      </p:grpSpPr>
+      <p:sp>
+        <p:nvSpPr>
+          <p:cNvPr id="2" name="Espace réservé de l'image des diapositives 1"/>
+          <p:cNvSpPr>
+            <a:spLocks noGrp="1" noRot="1" noChangeAspect="1"/>
+          </p:cNvSpPr>
+          <p:nvPr>
+            <p:ph type="sldImg"/>
+          </p:nvPr>
+        </p:nvSpPr>
+        <p:spPr/>
+      </p:sp>
+      <p:sp>
+        <p:nvSpPr>
+          <p:cNvPr id="3" name="Espace réservé des commentaires 2"/>
+          <p:cNvSpPr>
+            <a:spLocks noGrp="1"/>
+          </p:cNvSpPr>
+          <p:nvPr>
+            <p:ph type="body" idx="1"/>
+          </p:nvPr>
+        </p:nvSpPr>
+        <p:spPr/>
+        <p:txBody>
+          <a:bodyPr>
+            <a:normAutofit/>
+          </a:bodyPr>
+          <a:lstStyle/>
+          <a:p>
+            <a:endParaRPr lang="fr-CH" dirty="0"/>
+          </a:p>
+        </p:txBody>
+      </p:sp>
+      <p:sp>
+        <p:nvSpPr>
+          <p:cNvPr id="4" name="Espace réservé du numéro de diapositive 3"/>
+          <p:cNvSpPr>
+            <a:spLocks noGrp="1"/>
+          </p:cNvSpPr>
+          <p:nvPr>
+            <p:ph type="sldNum" sz="quarter" idx="10"/>
+          </p:nvPr>
+        </p:nvSpPr>
+        <p:spPr/>
+        <p:txBody>
+          <a:bodyPr/>
+          <a:lstStyle/>
+          <a:p>
+            <a:fld id="{BA64795F-8A88-462F-B7DA-E81DC07A4301}" type="slidenum">
+              <a:rPr lang="fr-CH" smtClean="0"/>
+              <a:pPr/>
+              <a:t>10</a:t>
+            </a:fld>
+            <a:endParaRPr lang="fr-CH"/>
+          </a:p>
+        </p:txBody>
+      </p:sp>
+    </p:spTree>
+  </p:cSld>
+  <p:clrMapOvr>
+    <a:masterClrMapping/>
+  </p:clrMapOvr>
+</p:notes>
+</file>
+
 <file path=ppt/slideLayouts/slideLayout1.xml><?xml version="1.0" encoding="utf-8"?>
 <p:sldLayout xmlns:a="http://schemas.openxmlformats.org/drawingml/2006/main" xmlns:r="http://schemas.openxmlformats.org/officeDocument/2006/relationships" xmlns:p="http://schemas.openxmlformats.org/presentationml/2006/main" type="title" preserve="1">
   <p:cSld name="Diapositive de titre">
@@ -796,7 +879,7 @@
             <a:fld id="{1FD82F67-3604-455A-AA94-463E3F4A9835}" type="datetime1">
               <a:rPr lang="fr-CH" smtClean="0"/>
               <a:pPr/>
-              <a:t>10.06.2010</a:t>
+              <a:t>11.06.2010</a:t>
             </a:fld>
             <a:endParaRPr lang="fr-FR" dirty="0"/>
           </a:p>
@@ -982,7 +1065,7 @@
             <a:fld id="{55B3CD59-5DD5-41C3-B883-761C206A7252}" type="datetime1">
               <a:rPr lang="fr-CH" smtClean="0"/>
               <a:pPr/>
-              <a:t>10.06.2010</a:t>
+              <a:t>11.06.2010</a:t>
             </a:fld>
             <a:endParaRPr lang="fr-FR" dirty="0"/>
           </a:p>
@@ -1178,7 +1261,7 @@
             <a:fld id="{3B04A12F-0005-45B2-8940-F8EFEAD0E451}" type="datetime1">
               <a:rPr lang="fr-CH" smtClean="0"/>
               <a:pPr/>
-              <a:t>10.06.2010</a:t>
+              <a:t>11.06.2010</a:t>
             </a:fld>
             <a:endParaRPr lang="fr-FR" dirty="0"/>
           </a:p>
@@ -1493,7 +1576,7 @@
             <a:fld id="{529FBE9A-CF7D-433F-8346-C0E52BDADA61}" type="datetime1">
               <a:rPr lang="fr-CH" smtClean="0"/>
               <a:pPr/>
-              <a:t>10.06.2010</a:t>
+              <a:t>11.06.2010</a:t>
             </a:fld>
             <a:endParaRPr lang="fr-FR" dirty="0"/>
           </a:p>
@@ -1676,7 +1759,7 @@
             <a:fld id="{FE683641-4180-4030-9871-18F1FE65C087}" type="datetime1">
               <a:rPr lang="fr-CH" smtClean="0"/>
               <a:pPr/>
-              <a:t>10.06.2010</a:t>
+              <a:t>11.06.2010</a:t>
             </a:fld>
             <a:endParaRPr lang="fr-FR" dirty="0"/>
           </a:p>
@@ -1872,7 +1955,7 @@
             <a:fld id="{DE3EECC3-BAC3-4A29-8636-7743FF9A3806}" type="datetime1">
               <a:rPr lang="fr-CH" smtClean="0"/>
               <a:pPr/>
-              <a:t>10.06.2010</a:t>
+              <a:t>11.06.2010</a:t>
             </a:fld>
             <a:endParaRPr lang="fr-FR" dirty="0"/>
           </a:p>
@@ -2080,7 +2163,7 @@
             <a:fld id="{F154968F-2762-4F3B-BC70-F7C39B89A9B8}" type="datetime1">
               <a:rPr lang="fr-CH" smtClean="0"/>
               <a:pPr/>
-              <a:t>10.06.2010</a:t>
+              <a:t>11.06.2010</a:t>
             </a:fld>
             <a:endParaRPr lang="fr-FR" dirty="0"/>
           </a:p>
@@ -2384,7 +2467,7 @@
             <a:fld id="{05BFEB41-E5CB-4CD1-9B55-92701C8EBC84}" type="datetime1">
               <a:rPr lang="fr-CH" smtClean="0"/>
               <a:pPr/>
-              <a:t>10.06.2010</a:t>
+              <a:t>11.06.2010</a:t>
             </a:fld>
             <a:endParaRPr lang="fr-FR" dirty="0"/>
           </a:p>
@@ -2822,7 +2905,7 @@
             <a:fld id="{2F6C9831-039A-4F5C-8AD2-A3AB876185B4}" type="datetime1">
               <a:rPr lang="fr-CH" smtClean="0"/>
               <a:pPr/>
-              <a:t>10.06.2010</a:t>
+              <a:t>11.06.2010</a:t>
             </a:fld>
             <a:endParaRPr lang="fr-FR" dirty="0"/>
           </a:p>
@@ -2956,7 +3039,7 @@
             <a:fld id="{DFFDC1B0-BD04-46D2-99EE-B853352D89B2}" type="datetime1">
               <a:rPr lang="fr-CH" smtClean="0"/>
               <a:pPr/>
-              <a:t>10.06.2010</a:t>
+              <a:t>11.06.2010</a:t>
             </a:fld>
             <a:endParaRPr lang="fr-FR" dirty="0"/>
           </a:p>
@@ -3067,7 +3150,7 @@
             <a:fld id="{0EE68050-7145-4A91-894E-A242682B636F}" type="datetime1">
               <a:rPr lang="fr-CH" smtClean="0"/>
               <a:pPr/>
-              <a:t>10.06.2010</a:t>
+              <a:t>11.06.2010</a:t>
             </a:fld>
             <a:endParaRPr lang="fr-FR" dirty="0"/>
           </a:p>
@@ -3360,7 +3443,7 @@
             <a:fld id="{3A01947D-F275-402E-B528-25DF2F067B3A}" type="datetime1">
               <a:rPr lang="fr-CH" smtClean="0"/>
               <a:pPr/>
-              <a:t>10.06.2010</a:t>
+              <a:t>11.06.2010</a:t>
             </a:fld>
             <a:endParaRPr lang="fr-FR" dirty="0"/>
           </a:p>
@@ -3629,7 +3712,7 @@
             <a:fld id="{99628070-4574-4C78-8FCC-ABF8CA883542}" type="datetime1">
               <a:rPr lang="fr-CH" smtClean="0"/>
               <a:pPr/>
-              <a:t>10.06.2010</a:t>
+              <a:t>11.06.2010</a:t>
             </a:fld>
             <a:endParaRPr lang="fr-FR" dirty="0"/>
           </a:p>
@@ -3882,7 +3965,7 @@
             <a:fld id="{0EBF62BA-94E3-4FC8-A8F1-27E713C8C858}" type="datetime1">
               <a:rPr lang="fr-CH" smtClean="0"/>
               <a:pPr/>
-              <a:t>10.06.2010</a:t>
+              <a:t>11.06.2010</a:t>
             </a:fld>
             <a:endParaRPr lang="fr-FR" dirty="0"/>
           </a:p>
@@ -4865,9 +4948,251 @@
           <a:chExt cx="0" cy="0"/>
         </a:xfrm>
       </p:grpSpPr>
-      <p:sp>
-        <p:nvSpPr>
-          <p:cNvPr id="29700" name="Rectangle 4"/>
+      <p:grpSp>
+        <p:nvGrpSpPr>
+          <p:cNvPr id="2" name="Groupe 23"/>
+          <p:cNvGrpSpPr/>
+          <p:nvPr/>
+        </p:nvGrpSpPr>
+        <p:grpSpPr>
+          <a:xfrm>
+            <a:off x="1043608" y="1881052"/>
+            <a:ext cx="1116124" cy="530275"/>
+            <a:chOff x="827584" y="2240868"/>
+            <a:chExt cx="1116124" cy="530275"/>
+          </a:xfrm>
+        </p:grpSpPr>
+        <p:sp>
+          <p:nvSpPr>
+            <p:cNvPr id="22" name="Flèche droite 21"/>
+            <p:cNvSpPr/>
+            <p:nvPr/>
+          </p:nvSpPr>
+          <p:spPr bwMode="auto">
+            <a:xfrm>
+              <a:off x="827584" y="2240868"/>
+              <a:ext cx="1116124" cy="251916"/>
+            </a:xfrm>
+            <a:prstGeom prst="rightArrow">
+              <a:avLst/>
+            </a:prstGeom>
+            <a:solidFill>
+              <a:schemeClr val="accent1"/>
+            </a:solidFill>
+            <a:ln w="9525" cap="flat" cmpd="sng" algn="ctr">
+              <a:solidFill>
+                <a:schemeClr val="tx1"/>
+              </a:solidFill>
+              <a:prstDash val="solid"/>
+              <a:round/>
+              <a:headEnd type="none" w="med" len="med"/>
+              <a:tailEnd type="none" w="med" len="med"/>
+            </a:ln>
+            <a:effectLst/>
+          </p:spPr>
+          <p:txBody>
+            <a:bodyPr vert="horz" wrap="square" lIns="91440" tIns="45720" rIns="91440" bIns="45720" numCol="1" rtlCol="0" anchor="t" anchorCtr="0" compatLnSpc="1">
+              <a:prstTxWarp prst="textNoShape">
+                <a:avLst/>
+              </a:prstTxWarp>
+            </a:bodyPr>
+            <a:lstStyle/>
+            <a:p>
+              <a:pPr marL="0" marR="0" indent="0" algn="l" defTabSz="914400" rtl="0" eaLnBrk="1" fontAlgn="base" latinLnBrk="0" hangingPunct="1">
+                <a:lnSpc>
+                  <a:spcPct val="100000"/>
+                </a:lnSpc>
+                <a:spcBef>
+                  <a:spcPct val="0"/>
+                </a:spcBef>
+                <a:spcAft>
+                  <a:spcPct val="0"/>
+                </a:spcAft>
+                <a:buClrTx/>
+                <a:buSzTx/>
+                <a:buFontTx/>
+                <a:buNone/>
+                <a:tabLst/>
+              </a:pPr>
+              <a:endParaRPr kumimoji="0" lang="fr-CH" sz="1800" b="0" i="0" u="sng" strike="noStrike" cap="none" normalizeH="0" baseline="0" smtClean="0">
+                <a:ln>
+                  <a:noFill/>
+                </a:ln>
+                <a:solidFill>
+                  <a:schemeClr val="tx1"/>
+                </a:solidFill>
+                <a:effectLst/>
+                <a:latin typeface="Arial" charset="0"/>
+              </a:endParaRPr>
+            </a:p>
+          </p:txBody>
+        </p:sp>
+        <p:sp>
+          <p:nvSpPr>
+            <p:cNvPr id="23" name="Flèche droite 22"/>
+            <p:cNvSpPr/>
+            <p:nvPr/>
+          </p:nvSpPr>
+          <p:spPr bwMode="auto">
+            <a:xfrm rot="10800000">
+              <a:off x="827584" y="2519227"/>
+              <a:ext cx="1116124" cy="251916"/>
+            </a:xfrm>
+            <a:prstGeom prst="rightArrow">
+              <a:avLst/>
+            </a:prstGeom>
+            <a:solidFill>
+              <a:schemeClr val="accent1"/>
+            </a:solidFill>
+            <a:ln w="9525" cap="flat" cmpd="sng" algn="ctr">
+              <a:solidFill>
+                <a:schemeClr val="tx1"/>
+              </a:solidFill>
+              <a:prstDash val="solid"/>
+              <a:round/>
+              <a:headEnd type="none" w="med" len="med"/>
+              <a:tailEnd type="none" w="med" len="med"/>
+            </a:ln>
+            <a:effectLst/>
+          </p:spPr>
+          <p:txBody>
+            <a:bodyPr vert="horz" wrap="square" lIns="91440" tIns="45720" rIns="91440" bIns="45720" numCol="1" rtlCol="0" anchor="t" anchorCtr="0" compatLnSpc="1">
+              <a:prstTxWarp prst="textNoShape">
+                <a:avLst/>
+              </a:prstTxWarp>
+            </a:bodyPr>
+            <a:lstStyle/>
+            <a:p>
+              <a:pPr marL="0" marR="0" indent="0" algn="l" defTabSz="914400" rtl="0" eaLnBrk="1" fontAlgn="base" latinLnBrk="0" hangingPunct="1">
+                <a:lnSpc>
+                  <a:spcPct val="100000"/>
+                </a:lnSpc>
+                <a:spcBef>
+                  <a:spcPct val="0"/>
+                </a:spcBef>
+                <a:spcAft>
+                  <a:spcPct val="0"/>
+                </a:spcAft>
+                <a:buClrTx/>
+                <a:buSzTx/>
+                <a:buFontTx/>
+                <a:buNone/>
+                <a:tabLst/>
+              </a:pPr>
+              <a:endParaRPr kumimoji="0" lang="fr-CH" sz="1800" b="0" i="0" u="sng" strike="noStrike" cap="none" normalizeH="0" baseline="0" smtClean="0">
+                <a:ln>
+                  <a:noFill/>
+                </a:ln>
+                <a:solidFill>
+                  <a:schemeClr val="tx1"/>
+                </a:solidFill>
+                <a:effectLst/>
+                <a:latin typeface="Arial" charset="0"/>
+              </a:endParaRPr>
+            </a:p>
+          </p:txBody>
+        </p:sp>
+      </p:grpSp>
+      <p:sp>
+        <p:nvSpPr>
+          <p:cNvPr id="4" name="Espace réservé de la date 3"/>
+          <p:cNvSpPr>
+            <a:spLocks noGrp="1"/>
+          </p:cNvSpPr>
+          <p:nvPr>
+            <p:ph type="dt" sz="half" idx="10"/>
+          </p:nvPr>
+        </p:nvSpPr>
+        <p:spPr>
+          <a:xfrm>
+            <a:off x="457200" y="6384972"/>
+            <a:ext cx="2133600" cy="476250"/>
+          </a:xfrm>
+        </p:spPr>
+        <p:txBody>
+          <a:bodyPr/>
+          <a:lstStyle/>
+          <a:p>
+            <a:fld id="{DE3EECC3-BAC3-4A29-8636-7743FF9A3806}" type="datetime1">
+              <a:rPr lang="fr-CH" smtClean="0">
+                <a:solidFill>
+                  <a:schemeClr val="tx1">
+                    <a:lumMod val="65000"/>
+                    <a:lumOff val="35000"/>
+                  </a:schemeClr>
+                </a:solidFill>
+              </a:rPr>
+              <a:pPr/>
+              <a:t>11.06.2010</a:t>
+            </a:fld>
+            <a:endParaRPr lang="fr-FR" dirty="0">
+              <a:solidFill>
+                <a:schemeClr val="tx1">
+                  <a:lumMod val="65000"/>
+                  <a:lumOff val="35000"/>
+                </a:schemeClr>
+              </a:solidFill>
+            </a:endParaRPr>
+          </a:p>
+        </p:txBody>
+      </p:sp>
+      <p:sp>
+        <p:nvSpPr>
+          <p:cNvPr id="6" name="Espace réservé du numéro de diapositive 5"/>
+          <p:cNvSpPr>
+            <a:spLocks noGrp="1"/>
+          </p:cNvSpPr>
+          <p:nvPr>
+            <p:ph type="sldNum" sz="quarter" idx="12"/>
+          </p:nvPr>
+        </p:nvSpPr>
+        <p:spPr>
+          <a:xfrm>
+            <a:off x="6553200" y="6384972"/>
+            <a:ext cx="2133600" cy="476250"/>
+          </a:xfrm>
+        </p:spPr>
+        <p:txBody>
+          <a:bodyPr/>
+          <a:lstStyle/>
+          <a:p>
+            <a:fld id="{420F5742-7484-4AFF-BE5C-C36DF30CE89D}" type="slidenum">
+              <a:rPr lang="fr-FR" smtClean="0">
+                <a:solidFill>
+                  <a:schemeClr val="tx1">
+                    <a:lumMod val="65000"/>
+                    <a:lumOff val="35000"/>
+                  </a:schemeClr>
+                </a:solidFill>
+              </a:rPr>
+              <a:pPr/>
+              <a:t>10</a:t>
+            </a:fld>
+            <a:r>
+              <a:rPr lang="fr-FR" dirty="0" smtClean="0">
+                <a:solidFill>
+                  <a:schemeClr val="tx1">
+                    <a:lumMod val="65000"/>
+                    <a:lumOff val="35000"/>
+                  </a:schemeClr>
+                </a:solidFill>
+              </a:rPr>
+              <a:t>/13</a:t>
+            </a:r>
+            <a:endParaRPr lang="fr-FR" dirty="0">
+              <a:solidFill>
+                <a:schemeClr val="tx1">
+                  <a:lumMod val="65000"/>
+                  <a:lumOff val="35000"/>
+                </a:schemeClr>
+              </a:solidFill>
+            </a:endParaRPr>
+          </a:p>
+        </p:txBody>
+      </p:sp>
+      <p:sp>
+        <p:nvSpPr>
+          <p:cNvPr id="7" name="Rectangle 4"/>
           <p:cNvSpPr>
             <a:spLocks noChangeArrowheads="1"/>
           </p:cNvSpPr>
@@ -4910,7 +5235,7 @@
       </p:sp>
       <p:sp>
         <p:nvSpPr>
-          <p:cNvPr id="29709" name="Rectangle 13"/>
+          <p:cNvPr id="8" name="Rectangle 33"/>
           <p:cNvSpPr>
             <a:spLocks noChangeArrowheads="1"/>
           </p:cNvSpPr>
@@ -4955,7 +5280,67 @@
       </p:sp>
       <p:sp>
         <p:nvSpPr>
-          <p:cNvPr id="29710" name="Rectangle 14"/>
+          <p:cNvPr id="11" name="Text Box 5"/>
+          <p:cNvSpPr txBox="1">
+            <a:spLocks noChangeArrowheads="1"/>
+          </p:cNvSpPr>
+          <p:nvPr/>
+        </p:nvSpPr>
+        <p:spPr bwMode="auto">
+          <a:xfrm>
+            <a:off x="0" y="381000"/>
+            <a:ext cx="9144000" cy="396875"/>
+          </a:xfrm>
+          <a:prstGeom prst="rect">
+            <a:avLst/>
+          </a:prstGeom>
+          <a:noFill/>
+          <a:ln w="9525">
+            <a:noFill/>
+            <a:miter lim="800000"/>
+            <a:headEnd/>
+            <a:tailEnd/>
+          </a:ln>
+          <a:effectLst/>
+        </p:spPr>
+        <p:txBody>
+          <a:bodyPr>
+            <a:spAutoFit/>
+          </a:bodyPr>
+          <a:lstStyle/>
+          <a:p>
+            <a:pPr algn="ctr"/>
+            <a:r>
+              <a:rPr lang="fr-FR" sz="2000" b="1" u="none" dirty="0" smtClean="0">
+                <a:solidFill>
+                  <a:schemeClr val="bg1"/>
+                </a:solidFill>
+                <a:effectLst>
+                  <a:outerShdw blurRad="38100" dist="38100" dir="2700000" algn="tl">
+                    <a:srgbClr val="C0C0C0"/>
+                  </a:outerShdw>
+                </a:effectLst>
+                <a:latin typeface="Trebuchet MS" pitchFamily="34" charset="0"/>
+              </a:rPr>
+              <a:t>CLIENT / SERVEUR</a:t>
+            </a:r>
+            <a:endParaRPr lang="fr-FR" sz="2000" b="1" u="none" dirty="0">
+              <a:solidFill>
+                <a:schemeClr val="bg1"/>
+              </a:solidFill>
+              <a:effectLst>
+                <a:outerShdw blurRad="38100" dist="38100" dir="2700000" algn="tl">
+                  <a:srgbClr val="C0C0C0"/>
+                </a:outerShdw>
+              </a:effectLst>
+              <a:latin typeface="Trebuchet MS" pitchFamily="34" charset="0"/>
+            </a:endParaRPr>
+          </a:p>
+        </p:txBody>
+      </p:sp>
+      <p:sp>
+        <p:nvSpPr>
+          <p:cNvPr id="104" name="Rectangle 34"/>
           <p:cNvSpPr>
             <a:spLocks noChangeArrowheads="1"/>
           </p:cNvSpPr>
@@ -4963,7 +5348,7 @@
         </p:nvSpPr>
         <p:spPr bwMode="auto">
           <a:xfrm>
-            <a:off x="0" y="6629400"/>
+            <a:off x="0" y="6632622"/>
             <a:ext cx="9144000" cy="228600"/>
           </a:xfrm>
           <a:prstGeom prst="rect">
@@ -5000,164 +5385,7 @@
       </p:sp>
       <p:sp>
         <p:nvSpPr>
-          <p:cNvPr id="12" name="Espace réservé du numéro de diapositive 11"/>
-          <p:cNvSpPr>
-            <a:spLocks noGrp="1"/>
-          </p:cNvSpPr>
-          <p:nvPr>
-            <p:ph type="sldNum" sz="quarter" idx="12"/>
-          </p:nvPr>
-        </p:nvSpPr>
-        <p:spPr>
-          <a:xfrm>
-            <a:off x="6553200" y="6384972"/>
-            <a:ext cx="2133600" cy="476250"/>
-          </a:xfrm>
-        </p:spPr>
-        <p:txBody>
-          <a:bodyPr/>
-          <a:lstStyle/>
-          <a:p>
-            <a:fld id="{81C47DC9-EC34-4064-A444-5DA14B88EED2}" type="slidenum">
-              <a:rPr lang="fr-FR" smtClean="0">
-                <a:solidFill>
-                  <a:schemeClr val="tx1">
-                    <a:lumMod val="65000"/>
-                    <a:lumOff val="35000"/>
-                  </a:schemeClr>
-                </a:solidFill>
-              </a:rPr>
-              <a:pPr/>
-              <a:t>10</a:t>
-            </a:fld>
-            <a:r>
-              <a:rPr lang="fr-FR" dirty="0" smtClean="0">
-                <a:solidFill>
-                  <a:schemeClr val="tx1">
-                    <a:lumMod val="65000"/>
-                    <a:lumOff val="35000"/>
-                  </a:schemeClr>
-                </a:solidFill>
-              </a:rPr>
-              <a:t>/13</a:t>
-            </a:r>
-            <a:endParaRPr lang="fr-FR" dirty="0">
-              <a:solidFill>
-                <a:schemeClr val="tx1">
-                  <a:lumMod val="65000"/>
-                  <a:lumOff val="35000"/>
-                </a:schemeClr>
-              </a:solidFill>
-            </a:endParaRPr>
-          </a:p>
-        </p:txBody>
-      </p:sp>
-      <p:sp>
-        <p:nvSpPr>
-          <p:cNvPr id="13" name="Espace réservé de la date 12"/>
-          <p:cNvSpPr>
-            <a:spLocks noGrp="1"/>
-          </p:cNvSpPr>
-          <p:nvPr>
-            <p:ph type="dt" sz="half" idx="10"/>
-          </p:nvPr>
-        </p:nvSpPr>
-        <p:spPr>
-          <a:xfrm>
-            <a:off x="457200" y="6384972"/>
-            <a:ext cx="2133600" cy="476250"/>
-          </a:xfrm>
-        </p:spPr>
-        <p:txBody>
-          <a:bodyPr/>
-          <a:lstStyle/>
-          <a:p>
-            <a:fld id="{F29294AF-8558-4D43-8C8C-7FA1E6073AB3}" type="datetime1">
-              <a:rPr lang="fr-CH" smtClean="0">
-                <a:solidFill>
-                  <a:schemeClr val="tx1">
-                    <a:lumMod val="65000"/>
-                    <a:lumOff val="35000"/>
-                  </a:schemeClr>
-                </a:solidFill>
-              </a:rPr>
-              <a:pPr/>
-              <a:t>10.06.2010</a:t>
-            </a:fld>
-            <a:endParaRPr lang="fr-FR">
-              <a:solidFill>
-                <a:schemeClr val="tx1">
-                  <a:lumMod val="65000"/>
-                  <a:lumOff val="35000"/>
-                </a:schemeClr>
-              </a:solidFill>
-            </a:endParaRPr>
-          </a:p>
-        </p:txBody>
-      </p:sp>
-      <p:sp>
-        <p:nvSpPr>
-          <p:cNvPr id="16" name="Text Box 5"/>
-          <p:cNvSpPr txBox="1">
-            <a:spLocks noChangeArrowheads="1"/>
-          </p:cNvSpPr>
-          <p:nvPr/>
-        </p:nvSpPr>
-        <p:spPr bwMode="auto">
-          <a:xfrm>
-            <a:off x="0" y="381000"/>
-            <a:ext cx="9144000" cy="396875"/>
-          </a:xfrm>
-          <a:prstGeom prst="rect">
-            <a:avLst/>
-          </a:prstGeom>
-          <a:noFill/>
-          <a:ln w="9525">
-            <a:noFill/>
-            <a:miter lim="800000"/>
-            <a:headEnd/>
-            <a:tailEnd/>
-          </a:ln>
-          <a:effectLst/>
-        </p:spPr>
-        <p:txBody>
-          <a:bodyPr>
-            <a:spAutoFit/>
-          </a:bodyPr>
-          <a:lstStyle/>
-          <a:p>
-            <a:pPr algn="ctr"/>
-            <a:r>
-              <a:rPr lang="fr-FR" sz="2000" b="1" u="none" dirty="0" smtClean="0">
-                <a:solidFill>
-                  <a:schemeClr val="bg1"/>
-                </a:solidFill>
-                <a:effectLst>
-                  <a:outerShdw blurRad="38100" dist="38100" dir="2700000" algn="tl">
-                    <a:srgbClr val="C0C0C0"/>
-                  </a:outerShdw>
-                </a:effectLst>
-                <a:latin typeface="Trebuchet MS" pitchFamily="34" charset="0"/>
-              </a:rPr>
-              <a:t>DEMONSTRATION</a:t>
-            </a:r>
-            <a:endParaRPr lang="fr-FR" sz="2000" b="1" u="none" dirty="0">
-              <a:solidFill>
-                <a:schemeClr val="bg1"/>
-              </a:solidFill>
-              <a:effectLst>
-                <a:outerShdw blurRad="38100" dist="38100" dir="2700000" algn="tl">
-                  <a:srgbClr val="C0C0C0"/>
-                </a:outerShdw>
-              </a:effectLst>
-              <a:latin typeface="Trebuchet MS" pitchFamily="34" charset="0"/>
-            </a:endParaRPr>
-          </a:p>
-        </p:txBody>
-      </p:sp>
-      <p:sp>
-        <p:nvSpPr>
-          <p:cNvPr id="10" name="Espace réservé du pied de page 13"/>
+          <p:cNvPr id="105" name="Espace réservé du pied de page 13"/>
           <p:cNvSpPr>
             <a:spLocks noGrp="1"/>
           </p:cNvSpPr>
@@ -5191,14 +5419,272 @@
       </p:sp>
       <p:sp>
         <p:nvSpPr>
-          <p:cNvPr id="11" name="ZoneTexte 10"/>
+          <p:cNvPr id="36" name="Ellipse 35"/>
+          <p:cNvSpPr/>
+          <p:nvPr/>
+        </p:nvSpPr>
+        <p:spPr bwMode="auto">
+          <a:xfrm>
+            <a:off x="719572" y="1601238"/>
+            <a:ext cx="1801180" cy="1071678"/>
+          </a:xfrm>
+          <a:prstGeom prst="ellipse">
+            <a:avLst/>
+          </a:prstGeom>
+          <a:noFill/>
+          <a:ln w="9525" cap="flat" cmpd="sng" algn="ctr">
+            <a:solidFill>
+              <a:schemeClr val="tx1"/>
+            </a:solidFill>
+            <a:prstDash val="solid"/>
+            <a:round/>
+            <a:headEnd type="none" w="med" len="med"/>
+            <a:tailEnd type="none" w="med" len="med"/>
+          </a:ln>
+          <a:effectLst/>
+        </p:spPr>
+        <p:txBody>
+          <a:bodyPr vert="horz" wrap="square" lIns="91440" tIns="45720" rIns="91440" bIns="45720" numCol="1" rtlCol="0" anchor="t" anchorCtr="0" compatLnSpc="1">
+            <a:prstTxWarp prst="textNoShape">
+              <a:avLst/>
+            </a:prstTxWarp>
+          </a:bodyPr>
+          <a:lstStyle/>
+          <a:p>
+            <a:pPr marL="0" marR="0" indent="0" algn="l" defTabSz="914400" rtl="0" eaLnBrk="1" fontAlgn="base" latinLnBrk="0" hangingPunct="1">
+              <a:lnSpc>
+                <a:spcPct val="100000"/>
+              </a:lnSpc>
+              <a:spcBef>
+                <a:spcPct val="0"/>
+              </a:spcBef>
+              <a:spcAft>
+                <a:spcPct val="0"/>
+              </a:spcAft>
+              <a:buClrTx/>
+              <a:buSzTx/>
+              <a:buFontTx/>
+              <a:buNone/>
+              <a:tabLst/>
+            </a:pPr>
+            <a:endParaRPr kumimoji="0" lang="fr-CH" sz="1800" b="0" i="0" u="sng" strike="noStrike" cap="none" normalizeH="0" baseline="0" smtClean="0">
+              <a:ln>
+                <a:noFill/>
+              </a:ln>
+              <a:solidFill>
+                <a:schemeClr val="tx1"/>
+              </a:solidFill>
+              <a:effectLst/>
+              <a:latin typeface="Arial" charset="0"/>
+            </a:endParaRPr>
+          </a:p>
+        </p:txBody>
+      </p:sp>
+      <p:sp>
+        <p:nvSpPr>
+          <p:cNvPr id="43" name="Flèche droite 42"/>
+          <p:cNvSpPr/>
+          <p:nvPr/>
+        </p:nvSpPr>
+        <p:spPr bwMode="auto">
+          <a:xfrm>
+            <a:off x="4901716" y="2843262"/>
+            <a:ext cx="3630724" cy="720080"/>
+          </a:xfrm>
+          <a:prstGeom prst="rightArrow">
+            <a:avLst/>
+          </a:prstGeom>
+          <a:solidFill>
+            <a:schemeClr val="accent1"/>
+          </a:solidFill>
+          <a:ln w="9525" cap="flat" cmpd="sng" algn="ctr">
+            <a:solidFill>
+              <a:schemeClr val="tx1"/>
+            </a:solidFill>
+            <a:prstDash val="solid"/>
+            <a:round/>
+            <a:headEnd type="none" w="med" len="med"/>
+            <a:tailEnd type="none" w="med" len="med"/>
+          </a:ln>
+          <a:effectLst/>
+        </p:spPr>
+        <p:txBody>
+          <a:bodyPr vert="horz" wrap="square" lIns="91440" tIns="45720" rIns="91440" bIns="45720" numCol="1" rtlCol="0" anchor="t" anchorCtr="0" compatLnSpc="1">
+            <a:prstTxWarp prst="textNoShape">
+              <a:avLst/>
+            </a:prstTxWarp>
+          </a:bodyPr>
+          <a:lstStyle/>
+          <a:p>
+            <a:pPr marL="0" marR="0" indent="0" algn="l" defTabSz="914400" rtl="0" eaLnBrk="1" fontAlgn="base" latinLnBrk="0" hangingPunct="1">
+              <a:lnSpc>
+                <a:spcPct val="100000"/>
+              </a:lnSpc>
+              <a:spcBef>
+                <a:spcPct val="0"/>
+              </a:spcBef>
+              <a:spcAft>
+                <a:spcPct val="0"/>
+              </a:spcAft>
+              <a:buClrTx/>
+              <a:buSzTx/>
+              <a:buFontTx/>
+              <a:buNone/>
+              <a:tabLst/>
+            </a:pPr>
+            <a:endParaRPr kumimoji="0" lang="fr-CH" sz="1800" b="0" i="0" u="sng" strike="noStrike" cap="none" normalizeH="0" baseline="0" smtClean="0">
+              <a:ln>
+                <a:noFill/>
+              </a:ln>
+              <a:solidFill>
+                <a:schemeClr val="tx1"/>
+              </a:solidFill>
+              <a:effectLst/>
+              <a:latin typeface="Arial" charset="0"/>
+            </a:endParaRPr>
+          </a:p>
+        </p:txBody>
+      </p:sp>
+      <p:sp>
+        <p:nvSpPr>
+          <p:cNvPr id="46" name="Flèche droite 45"/>
+          <p:cNvSpPr/>
+          <p:nvPr/>
+        </p:nvSpPr>
+        <p:spPr bwMode="auto">
+          <a:xfrm rot="10800000">
+            <a:off x="4901716" y="4453767"/>
+            <a:ext cx="3630724" cy="1377825"/>
+          </a:xfrm>
+          <a:prstGeom prst="rightArrow">
+            <a:avLst/>
+          </a:prstGeom>
+          <a:solidFill>
+            <a:schemeClr val="accent1"/>
+          </a:solidFill>
+          <a:ln w="9525" cap="flat" cmpd="sng" algn="ctr">
+            <a:solidFill>
+              <a:schemeClr val="tx1"/>
+            </a:solidFill>
+            <a:prstDash val="solid"/>
+            <a:round/>
+            <a:headEnd type="none" w="med" len="med"/>
+            <a:tailEnd type="none" w="med" len="med"/>
+          </a:ln>
+          <a:effectLst/>
+        </p:spPr>
+        <p:txBody>
+          <a:bodyPr vert="vert270" wrap="square" lIns="91440" tIns="45720" rIns="91440" bIns="45720" numCol="1" rtlCol="0" anchor="t" anchorCtr="0" compatLnSpc="1">
+            <a:prstTxWarp prst="textNoShape">
+              <a:avLst/>
+            </a:prstTxWarp>
+          </a:bodyPr>
+          <a:lstStyle/>
+          <a:p>
+            <a:pPr marL="0" marR="0" indent="0" algn="l" defTabSz="914400" rtl="0" eaLnBrk="1" fontAlgn="base" latinLnBrk="0" hangingPunct="1">
+              <a:lnSpc>
+                <a:spcPct val="100000"/>
+              </a:lnSpc>
+              <a:spcBef>
+                <a:spcPct val="0"/>
+              </a:spcBef>
+              <a:spcAft>
+                <a:spcPct val="0"/>
+              </a:spcAft>
+              <a:buClrTx/>
+              <a:buSzTx/>
+              <a:buFontTx/>
+              <a:buNone/>
+              <a:tabLst/>
+            </a:pPr>
+            <a:endParaRPr kumimoji="0" lang="fr-CH" sz="1800" b="0" i="0" u="none" strike="noStrike" cap="none" normalizeH="0" baseline="0" dirty="0" smtClean="0">
+              <a:ln>
+                <a:noFill/>
+              </a:ln>
+              <a:solidFill>
+                <a:schemeClr val="tx1"/>
+              </a:solidFill>
+              <a:effectLst/>
+              <a:latin typeface="Arial" charset="0"/>
+            </a:endParaRPr>
+          </a:p>
+        </p:txBody>
+      </p:sp>
+      <p:sp>
+        <p:nvSpPr>
+          <p:cNvPr id="47" name="Flèche droite 46"/>
+          <p:cNvSpPr/>
+          <p:nvPr/>
+        </p:nvSpPr>
+        <p:spPr bwMode="auto">
+          <a:xfrm>
+            <a:off x="4900854" y="3825044"/>
+            <a:ext cx="3630724" cy="720080"/>
+          </a:xfrm>
+          <a:prstGeom prst="rightArrow">
+            <a:avLst/>
+          </a:prstGeom>
+          <a:solidFill>
+            <a:schemeClr val="accent1"/>
+          </a:solidFill>
+          <a:ln w="9525" cap="flat" cmpd="sng" algn="ctr">
+            <a:solidFill>
+              <a:schemeClr val="tx1"/>
+            </a:solidFill>
+            <a:prstDash val="solid"/>
+            <a:round/>
+            <a:headEnd type="none" w="med" len="med"/>
+            <a:tailEnd type="none" w="med" len="med"/>
+          </a:ln>
+          <a:effectLst/>
+        </p:spPr>
+        <p:txBody>
+          <a:bodyPr vert="horz" wrap="square" lIns="91440" tIns="45720" rIns="91440" bIns="45720" numCol="1" rtlCol="0" anchor="t" anchorCtr="0" compatLnSpc="1">
+            <a:prstTxWarp prst="textNoShape">
+              <a:avLst/>
+            </a:prstTxWarp>
+          </a:bodyPr>
+          <a:lstStyle/>
+          <a:p>
+            <a:pPr marL="0" marR="0" indent="0" algn="l" defTabSz="914400" rtl="0" eaLnBrk="1" fontAlgn="base" latinLnBrk="0" hangingPunct="1">
+              <a:lnSpc>
+                <a:spcPct val="100000"/>
+              </a:lnSpc>
+              <a:spcBef>
+                <a:spcPct val="0"/>
+              </a:spcBef>
+              <a:spcAft>
+                <a:spcPct val="0"/>
+              </a:spcAft>
+              <a:buClrTx/>
+              <a:buSzTx/>
+              <a:buFontTx/>
+              <a:buNone/>
+              <a:tabLst/>
+            </a:pPr>
+            <a:endParaRPr kumimoji="0" lang="fr-CH" sz="1800" b="0" i="0" u="none" strike="noStrike" cap="none" normalizeH="0" baseline="0" dirty="0" smtClean="0">
+              <a:ln>
+                <a:noFill/>
+              </a:ln>
+              <a:solidFill>
+                <a:schemeClr val="tx1"/>
+              </a:solidFill>
+              <a:effectLst/>
+              <a:latin typeface="Arial" charset="0"/>
+            </a:endParaRPr>
+          </a:p>
+        </p:txBody>
+      </p:sp>
+      <p:sp>
+        <p:nvSpPr>
+          <p:cNvPr id="50" name="ZoneTexte 49"/>
           <p:cNvSpPr txBox="1"/>
           <p:nvPr/>
         </p:nvSpPr>
         <p:spPr>
           <a:xfrm>
-            <a:off x="847674" y="1492785"/>
-            <a:ext cx="7598617" cy="1477328"/>
+            <a:off x="1760877" y="4571836"/>
+            <a:ext cx="2775119" cy="369332"/>
           </a:xfrm>
           <a:prstGeom prst="rect">
             <a:avLst/>
@@ -5206,58 +5692,165 @@
           <a:noFill/>
         </p:spPr>
         <p:txBody>
-          <a:bodyPr wrap="square" rtlCol="0">
+          <a:bodyPr wrap="none" rtlCol="0">
             <a:spAutoFit/>
           </a:bodyPr>
           <a:lstStyle/>
           <a:p>
-            <a:pPr>
-              <a:lnSpc>
-                <a:spcPct val="250000"/>
-              </a:lnSpc>
-            </a:pPr>
-            <a:r>
-              <a:rPr lang="fr-CH" u="none" dirty="0" err="1" smtClean="0"/>
-              <a:t>Lazhar</a:t>
-            </a:r>
-            <a:endParaRPr lang="fr-CH" u="none" dirty="0" smtClean="0"/>
-          </a:p>
-          <a:p>
-            <a:pPr>
-              <a:lnSpc>
-                <a:spcPct val="250000"/>
-              </a:lnSpc>
-            </a:pPr>
-            <a:endParaRPr lang="fr-CH" i="1" u="none" dirty="0"/>
-          </a:p>
-        </p:txBody>
-      </p:sp>
-      <p:pic>
-        <p:nvPicPr>
-          <p:cNvPr id="15" name="Picture 3" descr="C:\Documents and Settings\Administrateur\Bureau\images\14.01.png"/>
-          <p:cNvPicPr>
-            <a:picLocks noChangeAspect="1" noChangeArrowheads="1"/>
-          </p:cNvPicPr>
+            <a:r>
+              <a:rPr lang="fr-CH" b="1" u="none" dirty="0" smtClean="0"/>
+              <a:t>Canal 1 </a:t>
+            </a:r>
+            <a:r>
+              <a:rPr lang="fr-CH" u="none" dirty="0" smtClean="0"/>
+              <a:t>: Communication</a:t>
+            </a:r>
+            <a:endParaRPr lang="fr-CH" u="none" dirty="0"/>
+          </a:p>
+        </p:txBody>
+      </p:sp>
+      <p:sp>
+        <p:nvSpPr>
+          <p:cNvPr id="51" name="Rectangle 50"/>
+          <p:cNvSpPr/>
           <p:nvPr/>
-        </p:nvPicPr>
-        <p:blipFill>
-          <a:blip r:embed="rId2" cstate="print"/>
-          <a:srcRect/>
-          <a:stretch>
-            <a:fillRect/>
-          </a:stretch>
-        </p:blipFill>
-        <p:spPr bwMode="auto">
-          <a:xfrm>
-            <a:off x="2590800" y="1603350"/>
-            <a:ext cx="5811702" cy="4564125"/>
+        </p:nvSpPr>
+        <p:spPr>
+          <a:xfrm>
+            <a:off x="1799692" y="3032956"/>
+            <a:ext cx="2403287" cy="369332"/>
           </a:xfrm>
           <a:prstGeom prst="rect">
             <a:avLst/>
           </a:prstGeom>
-          <a:noFill/>
-        </p:spPr>
-      </p:pic>
+        </p:spPr>
+        <p:txBody>
+          <a:bodyPr wrap="none">
+            <a:spAutoFit/>
+          </a:bodyPr>
+          <a:lstStyle/>
+          <a:p>
+            <a:r>
+              <a:rPr lang="fr-CH" b="1" u="none" dirty="0" smtClean="0"/>
+              <a:t>Canal </a:t>
+            </a:r>
+            <a:r>
+              <a:rPr lang="fr-CH" b="1" u="none" dirty="0" smtClean="0"/>
+              <a:t>2 </a:t>
+            </a:r>
+            <a:r>
+              <a:rPr lang="fr-CH" u="none" dirty="0" smtClean="0"/>
+              <a:t>: </a:t>
+            </a:r>
+            <a:r>
+              <a:rPr lang="fr-CH" u="none" dirty="0" smtClean="0"/>
+              <a:t>Asynchrone</a:t>
+            </a:r>
+            <a:endParaRPr lang="fr-CH" u="none" dirty="0"/>
+          </a:p>
+        </p:txBody>
+      </p:sp>
+      <p:sp>
+        <p:nvSpPr>
+          <p:cNvPr id="52" name="Flèche à angle droit 51"/>
+          <p:cNvSpPr/>
+          <p:nvPr/>
+        </p:nvSpPr>
+        <p:spPr bwMode="auto">
+          <a:xfrm rot="10800000" flipH="1">
+            <a:off x="2771800" y="2070631"/>
+            <a:ext cx="3248000" cy="530276"/>
+          </a:xfrm>
+          <a:prstGeom prst="bentUpArrow">
+            <a:avLst>
+              <a:gd name="adj1" fmla="val 10630"/>
+              <a:gd name="adj2" fmla="val 16789"/>
+              <a:gd name="adj3" fmla="val 29106"/>
+            </a:avLst>
+          </a:prstGeom>
+          <a:solidFill>
+            <a:schemeClr val="tx1">
+              <a:lumMod val="95000"/>
+              <a:lumOff val="5000"/>
+            </a:schemeClr>
+          </a:solidFill>
+          <a:ln w="9525" cap="flat" cmpd="sng" algn="ctr">
+            <a:solidFill>
+              <a:schemeClr val="tx1"/>
+            </a:solidFill>
+            <a:prstDash val="solid"/>
+            <a:round/>
+            <a:headEnd type="none" w="med" len="med"/>
+            <a:tailEnd type="none" w="med" len="med"/>
+          </a:ln>
+          <a:effectLst/>
+        </p:spPr>
+        <p:txBody>
+          <a:bodyPr vert="horz" wrap="square" lIns="91440" tIns="45720" rIns="91440" bIns="45720" numCol="1" rtlCol="0" anchor="t" anchorCtr="0" compatLnSpc="1">
+            <a:prstTxWarp prst="textNoShape">
+              <a:avLst/>
+            </a:prstTxWarp>
+          </a:bodyPr>
+          <a:lstStyle/>
+          <a:p>
+            <a:pPr marL="0" marR="0" indent="0" algn="l" defTabSz="914400" rtl="0" eaLnBrk="1" fontAlgn="base" latinLnBrk="0" hangingPunct="1">
+              <a:lnSpc>
+                <a:spcPct val="100000"/>
+              </a:lnSpc>
+              <a:spcBef>
+                <a:spcPct val="0"/>
+              </a:spcBef>
+              <a:spcAft>
+                <a:spcPct val="0"/>
+              </a:spcAft>
+              <a:buClrTx/>
+              <a:buSzTx/>
+              <a:buFontTx/>
+              <a:buNone/>
+              <a:tabLst/>
+            </a:pPr>
+            <a:endParaRPr kumimoji="0" lang="fr-CH" sz="1800" b="0" i="0" u="sng" strike="noStrike" cap="none" normalizeH="0" baseline="0" smtClean="0">
+              <a:ln>
+                <a:noFill/>
+              </a:ln>
+              <a:solidFill>
+                <a:schemeClr val="tx1"/>
+              </a:solidFill>
+              <a:effectLst/>
+              <a:latin typeface="Arial" charset="0"/>
+            </a:endParaRPr>
+          </a:p>
+        </p:txBody>
+      </p:sp>
+      <p:cxnSp>
+        <p:nvCxnSpPr>
+          <p:cNvPr id="54" name="Connecteur droit 53"/>
+          <p:cNvCxnSpPr/>
+          <p:nvPr/>
+        </p:nvCxnSpPr>
+        <p:spPr bwMode="auto">
+          <a:xfrm>
+            <a:off x="4716016" y="3717032"/>
+            <a:ext cx="3970784" cy="0"/>
+          </a:xfrm>
+          <a:prstGeom prst="line">
+            <a:avLst/>
+          </a:prstGeom>
+          <a:solidFill>
+            <a:schemeClr val="accent1"/>
+          </a:solidFill>
+          <a:ln w="9525" cap="flat" cmpd="sng" algn="ctr">
+            <a:solidFill>
+              <a:schemeClr val="tx1"/>
+            </a:solidFill>
+            <a:prstDash val="dash"/>
+            <a:round/>
+            <a:headEnd type="none" w="med" len="med"/>
+            <a:tailEnd type="none" w="med" len="med"/>
+          </a:ln>
+          <a:effectLst/>
+        </p:spPr>
+      </p:cxnSp>
     </p:spTree>
   </p:cSld>
   <p:clrMapOvr>
@@ -5295,7 +5888,7 @@
       </p:grpSpPr>
       <p:sp>
         <p:nvSpPr>
-          <p:cNvPr id="27652" name="Rectangle 4"/>
+          <p:cNvPr id="29700" name="Rectangle 4"/>
           <p:cNvSpPr>
             <a:spLocks noChangeArrowheads="1"/>
           </p:cNvSpPr>
@@ -5309,7 +5902,7 @@
           <a:prstGeom prst="rect">
             <a:avLst/>
           </a:prstGeom>
-          <a:gradFill flip="none" rotWithShape="1">
+          <a:gradFill rotWithShape="1">
             <a:gsLst>
               <a:gs pos="0">
                 <a:srgbClr val="00B400"/>
@@ -5319,7 +5912,6 @@
               </a:gs>
             </a:gsLst>
             <a:lin ang="5400000" scaled="1"/>
-            <a:tileRect/>
           </a:gradFill>
           <a:ln w="9525">
             <a:noFill/>
@@ -5333,110 +5925,13 @@
           <a:bodyPr wrap="none" anchor="ctr"/>
           <a:lstStyle/>
           <a:p>
-            <a:endParaRPr lang="fr-CH" dirty="0"/>
-          </a:p>
-        </p:txBody>
-      </p:sp>
-      <p:sp>
-        <p:nvSpPr>
-          <p:cNvPr id="27653" name="Text Box 5"/>
-          <p:cNvSpPr txBox="1">
-            <a:spLocks noChangeArrowheads="1"/>
-          </p:cNvSpPr>
-          <p:nvPr/>
-        </p:nvSpPr>
-        <p:spPr bwMode="auto">
-          <a:xfrm>
-            <a:off x="0" y="381000"/>
-            <a:ext cx="9144000" cy="396875"/>
-          </a:xfrm>
-          <a:prstGeom prst="rect">
-            <a:avLst/>
-          </a:prstGeom>
-          <a:noFill/>
-          <a:ln w="9525">
-            <a:noFill/>
-            <a:miter lim="800000"/>
-            <a:headEnd/>
-            <a:tailEnd/>
-          </a:ln>
-          <a:effectLst/>
-        </p:spPr>
-        <p:txBody>
-          <a:bodyPr>
-            <a:spAutoFit/>
-          </a:bodyPr>
-          <a:lstStyle/>
-          <a:p>
-            <a:pPr algn="ctr"/>
-            <a:r>
-              <a:rPr lang="fr-CH" sz="2000" b="1" u="none" dirty="0">
-                <a:solidFill>
-                  <a:schemeClr val="bg1"/>
-                </a:solidFill>
-                <a:effectLst>
-                  <a:outerShdw blurRad="38100" dist="38100" dir="2700000" algn="tl">
-                    <a:srgbClr val="C0C0C0"/>
-                  </a:outerShdw>
-                </a:effectLst>
-                <a:latin typeface="Trebuchet MS" pitchFamily="34" charset="0"/>
-              </a:rPr>
-              <a:t>CONCLUSION</a:t>
-            </a:r>
-            <a:endParaRPr lang="fr-FR" sz="2000" b="1" u="none" dirty="0">
-              <a:solidFill>
-                <a:schemeClr val="bg1"/>
-              </a:solidFill>
-              <a:effectLst>
-                <a:outerShdw blurRad="38100" dist="38100" dir="2700000" algn="tl">
-                  <a:srgbClr val="C0C0C0"/>
-                </a:outerShdw>
-              </a:effectLst>
-              <a:latin typeface="Trebuchet MS" pitchFamily="34" charset="0"/>
-            </a:endParaRPr>
-          </a:p>
-        </p:txBody>
-      </p:sp>
-      <p:sp>
-        <p:nvSpPr>
-          <p:cNvPr id="27656" name="Rectangle 8"/>
-          <p:cNvSpPr>
-            <a:spLocks noChangeArrowheads="1"/>
-          </p:cNvSpPr>
-          <p:nvPr/>
-        </p:nvSpPr>
-        <p:spPr bwMode="auto">
-          <a:xfrm>
-            <a:off x="0" y="703263"/>
-            <a:ext cx="184150" cy="366712"/>
-          </a:xfrm>
-          <a:prstGeom prst="rect">
-            <a:avLst/>
-          </a:prstGeom>
-          <a:noFill/>
-          <a:ln w="9525">
-            <a:noFill/>
-            <a:miter lim="800000"/>
-            <a:headEnd/>
-            <a:tailEnd/>
-          </a:ln>
-          <a:effectLst/>
-        </p:spPr>
-        <p:txBody>
-          <a:bodyPr wrap="none" anchor="ctr">
-            <a:spAutoFit/>
-          </a:bodyPr>
-          <a:lstStyle/>
-          <a:p>
-            <a:endParaRPr lang="fr-FR" u="none" dirty="0">
-              <a:latin typeface="Trebuchet MS" pitchFamily="34" charset="0"/>
-            </a:endParaRPr>
-          </a:p>
-        </p:txBody>
-      </p:sp>
-      <p:sp>
-        <p:nvSpPr>
-          <p:cNvPr id="27755" name="Rectangle 107"/>
+            <a:endParaRPr lang="fr-CH"/>
+          </a:p>
+        </p:txBody>
+      </p:sp>
+      <p:sp>
+        <p:nvSpPr>
+          <p:cNvPr id="29709" name="Rectangle 13"/>
           <p:cNvSpPr>
             <a:spLocks noChangeArrowheads="1"/>
           </p:cNvSpPr>
@@ -5475,13 +5970,13 @@
           <a:bodyPr wrap="none" anchor="ctr"/>
           <a:lstStyle/>
           <a:p>
-            <a:endParaRPr lang="fr-CH" dirty="0"/>
-          </a:p>
-        </p:txBody>
-      </p:sp>
-      <p:sp>
-        <p:nvSpPr>
-          <p:cNvPr id="27756" name="Rectangle 108"/>
+            <a:endParaRPr lang="fr-CH"/>
+          </a:p>
+        </p:txBody>
+      </p:sp>
+      <p:sp>
+        <p:nvSpPr>
+          <p:cNvPr id="29710" name="Rectangle 14"/>
           <p:cNvSpPr>
             <a:spLocks noChangeArrowheads="1"/>
           </p:cNvSpPr>
@@ -5520,13 +6015,13 @@
           <a:bodyPr wrap="none" anchor="ctr"/>
           <a:lstStyle/>
           <a:p>
-            <a:endParaRPr lang="fr-CH" dirty="0"/>
-          </a:p>
-        </p:txBody>
-      </p:sp>
-      <p:sp>
-        <p:nvSpPr>
-          <p:cNvPr id="24" name="Espace réservé du numéro de diapositive 23"/>
+            <a:endParaRPr lang="fr-CH"/>
+          </a:p>
+        </p:txBody>
+      </p:sp>
+      <p:sp>
+        <p:nvSpPr>
+          <p:cNvPr id="12" name="Espace réservé du numéro de diapositive 11"/>
           <p:cNvSpPr>
             <a:spLocks noGrp="1"/>
           </p:cNvSpPr>
@@ -5544,7 +6039,7 @@
           <a:bodyPr/>
           <a:lstStyle/>
           <a:p>
-            <a:fld id="{420F5742-7484-4AFF-BE5C-C36DF30CE89D}" type="slidenum">
+            <a:fld id="{81C47DC9-EC34-4064-A444-5DA14B88EED2}" type="slidenum">
               <a:rPr lang="fr-FR" smtClean="0">
                 <a:solidFill>
                   <a:schemeClr val="tx1">
@@ -5580,6 +6075,532 @@
       </p:sp>
       <p:sp>
         <p:nvSpPr>
+          <p:cNvPr id="13" name="Espace réservé de la date 12"/>
+          <p:cNvSpPr>
+            <a:spLocks noGrp="1"/>
+          </p:cNvSpPr>
+          <p:nvPr>
+            <p:ph type="dt" sz="half" idx="10"/>
+          </p:nvPr>
+        </p:nvSpPr>
+        <p:spPr>
+          <a:xfrm>
+            <a:off x="457200" y="6384972"/>
+            <a:ext cx="2133600" cy="476250"/>
+          </a:xfrm>
+        </p:spPr>
+        <p:txBody>
+          <a:bodyPr/>
+          <a:lstStyle/>
+          <a:p>
+            <a:fld id="{F29294AF-8558-4D43-8C8C-7FA1E6073AB3}" type="datetime1">
+              <a:rPr lang="fr-CH" smtClean="0">
+                <a:solidFill>
+                  <a:schemeClr val="tx1">
+                    <a:lumMod val="65000"/>
+                    <a:lumOff val="35000"/>
+                  </a:schemeClr>
+                </a:solidFill>
+              </a:rPr>
+              <a:pPr/>
+              <a:t>11.06.2010</a:t>
+            </a:fld>
+            <a:endParaRPr lang="fr-FR">
+              <a:solidFill>
+                <a:schemeClr val="tx1">
+                  <a:lumMod val="65000"/>
+                  <a:lumOff val="35000"/>
+                </a:schemeClr>
+              </a:solidFill>
+            </a:endParaRPr>
+          </a:p>
+        </p:txBody>
+      </p:sp>
+      <p:sp>
+        <p:nvSpPr>
+          <p:cNvPr id="16" name="Text Box 5"/>
+          <p:cNvSpPr txBox="1">
+            <a:spLocks noChangeArrowheads="1"/>
+          </p:cNvSpPr>
+          <p:nvPr/>
+        </p:nvSpPr>
+        <p:spPr bwMode="auto">
+          <a:xfrm>
+            <a:off x="0" y="381000"/>
+            <a:ext cx="9144000" cy="396875"/>
+          </a:xfrm>
+          <a:prstGeom prst="rect">
+            <a:avLst/>
+          </a:prstGeom>
+          <a:noFill/>
+          <a:ln w="9525">
+            <a:noFill/>
+            <a:miter lim="800000"/>
+            <a:headEnd/>
+            <a:tailEnd/>
+          </a:ln>
+          <a:effectLst/>
+        </p:spPr>
+        <p:txBody>
+          <a:bodyPr>
+            <a:spAutoFit/>
+          </a:bodyPr>
+          <a:lstStyle/>
+          <a:p>
+            <a:pPr algn="ctr"/>
+            <a:r>
+              <a:rPr lang="fr-FR" sz="2000" b="1" u="none" dirty="0" smtClean="0">
+                <a:solidFill>
+                  <a:schemeClr val="bg1"/>
+                </a:solidFill>
+                <a:effectLst>
+                  <a:outerShdw blurRad="38100" dist="38100" dir="2700000" algn="tl">
+                    <a:srgbClr val="C0C0C0"/>
+                  </a:outerShdw>
+                </a:effectLst>
+                <a:latin typeface="Trebuchet MS" pitchFamily="34" charset="0"/>
+              </a:rPr>
+              <a:t>DEMONSTRATION</a:t>
+            </a:r>
+            <a:endParaRPr lang="fr-FR" sz="2000" b="1" u="none" dirty="0">
+              <a:solidFill>
+                <a:schemeClr val="bg1"/>
+              </a:solidFill>
+              <a:effectLst>
+                <a:outerShdw blurRad="38100" dist="38100" dir="2700000" algn="tl">
+                  <a:srgbClr val="C0C0C0"/>
+                </a:outerShdw>
+              </a:effectLst>
+              <a:latin typeface="Trebuchet MS" pitchFamily="34" charset="0"/>
+            </a:endParaRPr>
+          </a:p>
+        </p:txBody>
+      </p:sp>
+      <p:sp>
+        <p:nvSpPr>
+          <p:cNvPr id="10" name="Espace réservé du pied de page 13"/>
+          <p:cNvSpPr>
+            <a:spLocks noGrp="1"/>
+          </p:cNvSpPr>
+          <p:nvPr>
+            <p:ph type="ftr" sz="quarter" idx="11"/>
+          </p:nvPr>
+        </p:nvSpPr>
+        <p:spPr>
+          <a:xfrm>
+            <a:off x="3124200" y="6384972"/>
+            <a:ext cx="2895600" cy="476250"/>
+          </a:xfrm>
+        </p:spPr>
+        <p:txBody>
+          <a:bodyPr/>
+          <a:lstStyle/>
+          <a:p>
+            <a:r>
+              <a:rPr lang="fr-FR" dirty="0" smtClean="0">
+                <a:solidFill>
+                  <a:schemeClr val="tx1">
+                    <a:lumMod val="65000"/>
+                    <a:lumOff val="35000"/>
+                  </a:schemeClr>
+                </a:solidFill>
+              </a:rPr>
+              <a:t>ADO – PPZ – LFH – RPN</a:t>
+            </a:r>
+          </a:p>
+        </p:txBody>
+      </p:sp>
+      <p:sp>
+        <p:nvSpPr>
+          <p:cNvPr id="11" name="ZoneTexte 10"/>
+          <p:cNvSpPr txBox="1"/>
+          <p:nvPr/>
+        </p:nvSpPr>
+        <p:spPr>
+          <a:xfrm>
+            <a:off x="847674" y="1492785"/>
+            <a:ext cx="7598617" cy="1477328"/>
+          </a:xfrm>
+          <a:prstGeom prst="rect">
+            <a:avLst/>
+          </a:prstGeom>
+          <a:noFill/>
+        </p:spPr>
+        <p:txBody>
+          <a:bodyPr wrap="square" rtlCol="0">
+            <a:spAutoFit/>
+          </a:bodyPr>
+          <a:lstStyle/>
+          <a:p>
+            <a:pPr>
+              <a:lnSpc>
+                <a:spcPct val="250000"/>
+              </a:lnSpc>
+            </a:pPr>
+            <a:r>
+              <a:rPr lang="fr-CH" u="none" dirty="0" err="1" smtClean="0"/>
+              <a:t>Lazhar</a:t>
+            </a:r>
+            <a:endParaRPr lang="fr-CH" u="none" dirty="0" smtClean="0"/>
+          </a:p>
+          <a:p>
+            <a:pPr>
+              <a:lnSpc>
+                <a:spcPct val="250000"/>
+              </a:lnSpc>
+            </a:pPr>
+            <a:endParaRPr lang="fr-CH" i="1" u="none" dirty="0"/>
+          </a:p>
+        </p:txBody>
+      </p:sp>
+      <p:pic>
+        <p:nvPicPr>
+          <p:cNvPr id="15" name="Picture 3" descr="C:\Documents and Settings\Administrateur\Bureau\images\14.01.png"/>
+          <p:cNvPicPr>
+            <a:picLocks noChangeAspect="1" noChangeArrowheads="1"/>
+          </p:cNvPicPr>
+          <p:nvPr/>
+        </p:nvPicPr>
+        <p:blipFill>
+          <a:blip r:embed="rId2" cstate="print"/>
+          <a:srcRect/>
+          <a:stretch>
+            <a:fillRect/>
+          </a:stretch>
+        </p:blipFill>
+        <p:spPr bwMode="auto">
+          <a:xfrm>
+            <a:off x="2590800" y="1603350"/>
+            <a:ext cx="5811702" cy="4564125"/>
+          </a:xfrm>
+          <a:prstGeom prst="rect">
+            <a:avLst/>
+          </a:prstGeom>
+          <a:noFill/>
+        </p:spPr>
+      </p:pic>
+    </p:spTree>
+  </p:cSld>
+  <p:clrMapOvr>
+    <a:masterClrMapping/>
+  </p:clrMapOvr>
+  <p:transition>
+    <p:fade/>
+  </p:transition>
+  <p:timing>
+    <p:tnLst>
+      <p:par>
+        <p:cTn id="1" dur="indefinite" restart="never" nodeType="tmRoot"/>
+      </p:par>
+    </p:tnLst>
+  </p:timing>
+</p:sld>
+</file>
+
+<file path=ppt/slides/slide12.xml><?xml version="1.0" encoding="utf-8"?>
+<p:sld xmlns:a="http://schemas.openxmlformats.org/drawingml/2006/main" xmlns:r="http://schemas.openxmlformats.org/officeDocument/2006/relationships" xmlns:p="http://schemas.openxmlformats.org/presentationml/2006/main">
+  <p:cSld>
+    <p:spTree>
+      <p:nvGrpSpPr>
+        <p:cNvPr id="1" name=""/>
+        <p:cNvGrpSpPr/>
+        <p:nvPr/>
+      </p:nvGrpSpPr>
+      <p:grpSpPr>
+        <a:xfrm>
+          <a:off x="0" y="0"/>
+          <a:ext cx="0" cy="0"/>
+          <a:chOff x="0" y="0"/>
+          <a:chExt cx="0" cy="0"/>
+        </a:xfrm>
+      </p:grpSpPr>
+      <p:sp>
+        <p:nvSpPr>
+          <p:cNvPr id="27652" name="Rectangle 4"/>
+          <p:cNvSpPr>
+            <a:spLocks noChangeArrowheads="1"/>
+          </p:cNvSpPr>
+          <p:nvPr/>
+        </p:nvSpPr>
+        <p:spPr bwMode="auto">
+          <a:xfrm>
+            <a:off x="0" y="0"/>
+            <a:ext cx="9144000" cy="1143000"/>
+          </a:xfrm>
+          <a:prstGeom prst="rect">
+            <a:avLst/>
+          </a:prstGeom>
+          <a:gradFill flip="none" rotWithShape="1">
+            <a:gsLst>
+              <a:gs pos="0">
+                <a:srgbClr val="00B400"/>
+              </a:gs>
+              <a:gs pos="100000">
+                <a:srgbClr val="006000"/>
+              </a:gs>
+            </a:gsLst>
+            <a:lin ang="5400000" scaled="1"/>
+            <a:tileRect/>
+          </a:gradFill>
+          <a:ln w="9525">
+            <a:noFill/>
+            <a:miter lim="800000"/>
+            <a:headEnd/>
+            <a:tailEnd/>
+          </a:ln>
+          <a:effectLst/>
+        </p:spPr>
+        <p:txBody>
+          <a:bodyPr wrap="none" anchor="ctr"/>
+          <a:lstStyle/>
+          <a:p>
+            <a:endParaRPr lang="fr-CH" dirty="0"/>
+          </a:p>
+        </p:txBody>
+      </p:sp>
+      <p:sp>
+        <p:nvSpPr>
+          <p:cNvPr id="27653" name="Text Box 5"/>
+          <p:cNvSpPr txBox="1">
+            <a:spLocks noChangeArrowheads="1"/>
+          </p:cNvSpPr>
+          <p:nvPr/>
+        </p:nvSpPr>
+        <p:spPr bwMode="auto">
+          <a:xfrm>
+            <a:off x="0" y="381000"/>
+            <a:ext cx="9144000" cy="396875"/>
+          </a:xfrm>
+          <a:prstGeom prst="rect">
+            <a:avLst/>
+          </a:prstGeom>
+          <a:noFill/>
+          <a:ln w="9525">
+            <a:noFill/>
+            <a:miter lim="800000"/>
+            <a:headEnd/>
+            <a:tailEnd/>
+          </a:ln>
+          <a:effectLst/>
+        </p:spPr>
+        <p:txBody>
+          <a:bodyPr>
+            <a:spAutoFit/>
+          </a:bodyPr>
+          <a:lstStyle/>
+          <a:p>
+            <a:pPr algn="ctr"/>
+            <a:r>
+              <a:rPr lang="fr-CH" sz="2000" b="1" u="none" dirty="0">
+                <a:solidFill>
+                  <a:schemeClr val="bg1"/>
+                </a:solidFill>
+                <a:effectLst>
+                  <a:outerShdw blurRad="38100" dist="38100" dir="2700000" algn="tl">
+                    <a:srgbClr val="C0C0C0"/>
+                  </a:outerShdw>
+                </a:effectLst>
+                <a:latin typeface="Trebuchet MS" pitchFamily="34" charset="0"/>
+              </a:rPr>
+              <a:t>CONCLUSION</a:t>
+            </a:r>
+            <a:endParaRPr lang="fr-FR" sz="2000" b="1" u="none" dirty="0">
+              <a:solidFill>
+                <a:schemeClr val="bg1"/>
+              </a:solidFill>
+              <a:effectLst>
+                <a:outerShdw blurRad="38100" dist="38100" dir="2700000" algn="tl">
+                  <a:srgbClr val="C0C0C0"/>
+                </a:outerShdw>
+              </a:effectLst>
+              <a:latin typeface="Trebuchet MS" pitchFamily="34" charset="0"/>
+            </a:endParaRPr>
+          </a:p>
+        </p:txBody>
+      </p:sp>
+      <p:sp>
+        <p:nvSpPr>
+          <p:cNvPr id="27656" name="Rectangle 8"/>
+          <p:cNvSpPr>
+            <a:spLocks noChangeArrowheads="1"/>
+          </p:cNvSpPr>
+          <p:nvPr/>
+        </p:nvSpPr>
+        <p:spPr bwMode="auto">
+          <a:xfrm>
+            <a:off x="0" y="703263"/>
+            <a:ext cx="184150" cy="366712"/>
+          </a:xfrm>
+          <a:prstGeom prst="rect">
+            <a:avLst/>
+          </a:prstGeom>
+          <a:noFill/>
+          <a:ln w="9525">
+            <a:noFill/>
+            <a:miter lim="800000"/>
+            <a:headEnd/>
+            <a:tailEnd/>
+          </a:ln>
+          <a:effectLst/>
+        </p:spPr>
+        <p:txBody>
+          <a:bodyPr wrap="none" anchor="ctr">
+            <a:spAutoFit/>
+          </a:bodyPr>
+          <a:lstStyle/>
+          <a:p>
+            <a:endParaRPr lang="fr-FR" u="none" dirty="0">
+              <a:latin typeface="Trebuchet MS" pitchFamily="34" charset="0"/>
+            </a:endParaRPr>
+          </a:p>
+        </p:txBody>
+      </p:sp>
+      <p:sp>
+        <p:nvSpPr>
+          <p:cNvPr id="27755" name="Rectangle 107"/>
+          <p:cNvSpPr>
+            <a:spLocks noChangeArrowheads="1"/>
+          </p:cNvSpPr>
+          <p:nvPr/>
+        </p:nvSpPr>
+        <p:spPr bwMode="auto">
+          <a:xfrm>
+            <a:off x="0" y="1143000"/>
+            <a:ext cx="9144000" cy="152400"/>
+          </a:xfrm>
+          <a:prstGeom prst="rect">
+            <a:avLst/>
+          </a:prstGeom>
+          <a:gradFill rotWithShape="1">
+            <a:gsLst>
+              <a:gs pos="0">
+                <a:srgbClr val="5F5F5F"/>
+              </a:gs>
+              <a:gs pos="100000">
+                <a:srgbClr val="DDDDDD">
+                  <a:alpha val="0"/>
+                </a:srgbClr>
+              </a:gs>
+            </a:gsLst>
+            <a:lin ang="5400000" scaled="1"/>
+          </a:gradFill>
+          <a:ln w="9525">
+            <a:noFill/>
+            <a:miter lim="800000"/>
+            <a:headEnd/>
+            <a:tailEnd/>
+          </a:ln>
+          <a:effectLst/>
+        </p:spPr>
+        <p:txBody>
+          <a:bodyPr wrap="none" anchor="ctr"/>
+          <a:lstStyle/>
+          <a:p>
+            <a:endParaRPr lang="fr-CH" dirty="0"/>
+          </a:p>
+        </p:txBody>
+      </p:sp>
+      <p:sp>
+        <p:nvSpPr>
+          <p:cNvPr id="27756" name="Rectangle 108"/>
+          <p:cNvSpPr>
+            <a:spLocks noChangeArrowheads="1"/>
+          </p:cNvSpPr>
+          <p:nvPr/>
+        </p:nvSpPr>
+        <p:spPr bwMode="auto">
+          <a:xfrm>
+            <a:off x="0" y="6629400"/>
+            <a:ext cx="9144000" cy="228600"/>
+          </a:xfrm>
+          <a:prstGeom prst="rect">
+            <a:avLst/>
+          </a:prstGeom>
+          <a:gradFill rotWithShape="1">
+            <a:gsLst>
+              <a:gs pos="0">
+                <a:srgbClr val="DDDDDD">
+                  <a:alpha val="0"/>
+                </a:srgbClr>
+              </a:gs>
+              <a:gs pos="100000">
+                <a:srgbClr val="767676"/>
+              </a:gs>
+            </a:gsLst>
+            <a:lin ang="5400000" scaled="1"/>
+          </a:gradFill>
+          <a:ln w="9525">
+            <a:noFill/>
+            <a:miter lim="800000"/>
+            <a:headEnd/>
+            <a:tailEnd/>
+          </a:ln>
+          <a:effectLst/>
+        </p:spPr>
+        <p:txBody>
+          <a:bodyPr wrap="none" anchor="ctr"/>
+          <a:lstStyle/>
+          <a:p>
+            <a:endParaRPr lang="fr-CH" dirty="0"/>
+          </a:p>
+        </p:txBody>
+      </p:sp>
+      <p:sp>
+        <p:nvSpPr>
+          <p:cNvPr id="24" name="Espace réservé du numéro de diapositive 23"/>
+          <p:cNvSpPr>
+            <a:spLocks noGrp="1"/>
+          </p:cNvSpPr>
+          <p:nvPr>
+            <p:ph type="sldNum" sz="quarter" idx="12"/>
+          </p:nvPr>
+        </p:nvSpPr>
+        <p:spPr>
+          <a:xfrm>
+            <a:off x="6553200" y="6384972"/>
+            <a:ext cx="2133600" cy="476250"/>
+          </a:xfrm>
+        </p:spPr>
+        <p:txBody>
+          <a:bodyPr/>
+          <a:lstStyle/>
+          <a:p>
+            <a:fld id="{420F5742-7484-4AFF-BE5C-C36DF30CE89D}" type="slidenum">
+              <a:rPr lang="fr-FR" smtClean="0">
+                <a:solidFill>
+                  <a:schemeClr val="tx1">
+                    <a:lumMod val="65000"/>
+                    <a:lumOff val="35000"/>
+                  </a:schemeClr>
+                </a:solidFill>
+              </a:rPr>
+              <a:pPr/>
+              <a:t>12</a:t>
+            </a:fld>
+            <a:r>
+              <a:rPr lang="fr-FR" dirty="0" smtClean="0">
+                <a:solidFill>
+                  <a:schemeClr val="tx1">
+                    <a:lumMod val="65000"/>
+                    <a:lumOff val="35000"/>
+                  </a:schemeClr>
+                </a:solidFill>
+              </a:rPr>
+              <a:t>/13</a:t>
+            </a:r>
+            <a:endParaRPr lang="fr-FR" dirty="0">
+              <a:solidFill>
+                <a:schemeClr val="tx1">
+                  <a:lumMod val="65000"/>
+                  <a:lumOff val="35000"/>
+                </a:schemeClr>
+              </a:solidFill>
+            </a:endParaRPr>
+          </a:p>
+        </p:txBody>
+      </p:sp>
+      <p:sp>
+        <p:nvSpPr>
           <p:cNvPr id="25" name="Espace réservé de la date 24"/>
           <p:cNvSpPr>
             <a:spLocks noGrp="1"/>
@@ -5608,7 +6629,7 @@
                 </a:solidFill>
               </a:rPr>
               <a:pPr/>
-              <a:t>10.06.2010</a:t>
+              <a:t>11.06.2010</a:t>
             </a:fld>
             <a:endParaRPr lang="fr-FR" dirty="0">
               <a:solidFill>
@@ -6118,7 +7139,7 @@
 </p:sld>
 </file>
 
-<file path=ppt/slides/slide12.xml><?xml version="1.0" encoding="utf-8"?>
+<file path=ppt/slides/slide13.xml><?xml version="1.0" encoding="utf-8"?>
 <p:sld xmlns:a="http://schemas.openxmlformats.org/drawingml/2006/main" xmlns:r="http://schemas.openxmlformats.org/officeDocument/2006/relationships" xmlns:p="http://schemas.openxmlformats.org/presentationml/2006/main">
   <p:cSld>
     <p:spTree>
@@ -7143,7 +8164,7 @@
                 </a:solidFill>
               </a:rPr>
               <a:pPr/>
-              <a:t>12</a:t>
+              <a:t>13</a:t>
             </a:fld>
             <a:r>
               <a:rPr lang="fr-FR" dirty="0" smtClean="0">
@@ -7197,7 +8218,7 @@
                 </a:solidFill>
               </a:rPr>
               <a:pPr/>
-              <a:t>10.06.2010</a:t>
+              <a:t>11.06.2010</a:t>
             </a:fld>
             <a:endParaRPr lang="fr-FR" dirty="0">
               <a:solidFill>
@@ -7643,7 +8664,7 @@
                 </a:solidFill>
               </a:rPr>
               <a:pPr/>
-              <a:t>10.06.2010</a:t>
+              <a:t>11.06.2010</a:t>
             </a:fld>
             <a:endParaRPr lang="fr-FR" dirty="0">
               <a:solidFill>
@@ -8270,7 +9291,7 @@
                 </a:solidFill>
               </a:rPr>
               <a:pPr/>
-              <a:t>10.06.2010</a:t>
+              <a:t>11.06.2010</a:t>
             </a:fld>
             <a:endParaRPr lang="fr-FR" dirty="0">
               <a:solidFill>
@@ -8964,7 +9985,7 @@
                 </a:solidFill>
               </a:rPr>
               <a:pPr/>
-              <a:t>10.06.2010</a:t>
+              <a:t>11.06.2010</a:t>
             </a:fld>
             <a:endParaRPr lang="fr-FR" dirty="0">
               <a:solidFill>
@@ -11766,7 +12787,7 @@
                 </a:solidFill>
               </a:rPr>
               <a:pPr/>
-              <a:t>10.06.2010</a:t>
+              <a:t>11.06.2010</a:t>
             </a:fld>
             <a:endParaRPr lang="fr-FR">
               <a:solidFill>
@@ -12167,7 +13188,7 @@
                 </a:solidFill>
               </a:rPr>
               <a:pPr/>
-              <a:t>10.06.2010</a:t>
+              <a:t>11.06.2010</a:t>
             </a:fld>
             <a:endParaRPr lang="fr-FR" dirty="0">
               <a:solidFill>
@@ -12466,7 +13487,7 @@
                 </a:solidFill>
               </a:rPr>
               <a:pPr/>
-              <a:t>10.06.2010</a:t>
+              <a:t>11.06.2010</a:t>
             </a:fld>
             <a:endParaRPr lang="fr-FR">
               <a:solidFill>
@@ -12855,7 +13876,7 @@
                 </a:solidFill>
               </a:rPr>
               <a:pPr/>
-              <a:t>10.06.2010</a:t>
+              <a:t>11.06.2010</a:t>
             </a:fld>
             <a:endParaRPr lang="fr-FR" dirty="0">
               <a:solidFill>
@@ -13215,7 +14236,7 @@
                 </a:solidFill>
               </a:rPr>
               <a:pPr/>
-              <a:t>10.06.2010</a:t>
+              <a:t>11.06.2010</a:t>
             </a:fld>
             <a:endParaRPr lang="fr-FR" dirty="0">
               <a:solidFill>
@@ -13574,16 +14595,6 @@
               </a:rPr>
               <a:t>Joueur</a:t>
             </a:r>
-            <a:endParaRPr kumimoji="0" lang="fr-CH" sz="1800" b="0" i="0" u="none" strike="noStrike" cap="none" normalizeH="0" baseline="0" dirty="0" smtClean="0">
-              <a:ln>
-                <a:noFill/>
-              </a:ln>
-              <a:solidFill>
-                <a:schemeClr val="tx1"/>
-              </a:solidFill>
-              <a:effectLst/>
-              <a:latin typeface="Arial" charset="0"/>
-            </a:endParaRPr>
           </a:p>
         </p:txBody>
       </p:sp>
@@ -13752,16 +14763,6 @@
               </a:rPr>
               <a:t>Ecouteur</a:t>
             </a:r>
-            <a:endParaRPr kumimoji="0" lang="fr-CH" sz="1800" b="0" i="0" u="none" strike="noStrike" cap="none" normalizeH="0" baseline="0" dirty="0" smtClean="0">
-              <a:ln>
-                <a:noFill/>
-              </a:ln>
-              <a:solidFill>
-                <a:schemeClr val="tx1"/>
-              </a:solidFill>
-              <a:effectLst/>
-              <a:latin typeface="Arial" charset="0"/>
-            </a:endParaRPr>
           </a:p>
         </p:txBody>
       </p:sp>
@@ -13830,16 +14831,6 @@
               </a:rPr>
               <a:t>Joueur</a:t>
             </a:r>
-            <a:endParaRPr kumimoji="0" lang="fr-CH" sz="1800" b="0" i="0" u="none" strike="noStrike" cap="none" normalizeH="0" baseline="0" dirty="0" smtClean="0">
-              <a:ln>
-                <a:noFill/>
-              </a:ln>
-              <a:solidFill>
-                <a:schemeClr val="tx1"/>
-              </a:solidFill>
-              <a:effectLst/>
-              <a:latin typeface="Arial" charset="0"/>
-            </a:endParaRPr>
           </a:p>
         </p:txBody>
       </p:sp>
@@ -13908,16 +14899,6 @@
               </a:rPr>
               <a:t>Joueur</a:t>
             </a:r>
-            <a:endParaRPr kumimoji="0" lang="fr-CH" sz="1800" b="0" i="0" u="none" strike="noStrike" cap="none" normalizeH="0" baseline="0" dirty="0" smtClean="0">
-              <a:ln>
-                <a:noFill/>
-              </a:ln>
-              <a:solidFill>
-                <a:schemeClr val="tx1"/>
-              </a:solidFill>
-              <a:effectLst/>
-              <a:latin typeface="Arial" charset="0"/>
-            </a:endParaRPr>
           </a:p>
         </p:txBody>
       </p:sp>
@@ -13986,16 +14967,6 @@
               </a:rPr>
               <a:t>Joueur</a:t>
             </a:r>
-            <a:endParaRPr kumimoji="0" lang="fr-CH" sz="1800" b="0" i="0" u="none" strike="noStrike" cap="none" normalizeH="0" baseline="0" dirty="0" smtClean="0">
-              <a:ln>
-                <a:noFill/>
-              </a:ln>
-              <a:solidFill>
-                <a:schemeClr val="tx1"/>
-              </a:solidFill>
-              <a:effectLst/>
-              <a:latin typeface="Arial" charset="0"/>
-            </a:endParaRPr>
           </a:p>
         </p:txBody>
       </p:sp>
@@ -14564,16 +15535,6 @@
               </a:rPr>
               <a:t>Serveur</a:t>
             </a:r>
-            <a:endParaRPr kumimoji="0" lang="fr-CH" sz="1800" b="0" i="0" u="none" strike="noStrike" cap="none" normalizeH="0" baseline="0" dirty="0" smtClean="0">
-              <a:ln>
-                <a:noFill/>
-              </a:ln>
-              <a:solidFill>
-                <a:schemeClr val="tx1"/>
-              </a:solidFill>
-              <a:effectLst/>
-              <a:latin typeface="Arial" charset="0"/>
-            </a:endParaRPr>
           </a:p>
         </p:txBody>
       </p:sp>
@@ -14861,7 +15822,7 @@
         <p:spPr bwMode="auto">
           <a:xfrm>
             <a:off x="2951820" y="3860936"/>
-            <a:ext cx="781726" cy="918030"/>
+            <a:ext cx="936104" cy="918030"/>
           </a:xfrm>
           <a:prstGeom prst="leftUpArrow">
             <a:avLst>

</xml_diff>